<commit_message>
changed template slide to be 13.3333inches by 10 inches instead of 10x7.5 updated template function names to be lowercase
</commit_message>
<xml_diff>
--- a/@toPPT/Template.pptx
+++ b/@toPPT/Template.pptx
@@ -13,7 +13,7 @@
   <p:sldIdLst>
     <p:sldId id="256" r:id="rId2"/>
   </p:sldIdLst>
-  <p:sldSz cx="9144000" cy="6858000" type="screen4x3"/>
+  <p:sldSz cx="12192000" cy="9144000"/>
   <p:notesSz cx="6858000" cy="9144000"/>
   <p:defaultTextStyle>
     <a:defPPr>
@@ -26,7 +26,7 @@
       <a:spcAft>
         <a:spcPct val="0"/>
       </a:spcAft>
-      <a:defRPr sz="2400" kern="1200">
+      <a:defRPr sz="3200" kern="1200">
         <a:solidFill>
           <a:schemeClr val="tx1"/>
         </a:solidFill>
@@ -35,14 +35,14 @@
         <a:cs typeface="+mn-cs"/>
       </a:defRPr>
     </a:lvl1pPr>
-    <a:lvl2pPr marL="457200" algn="l" rtl="0" fontAlgn="base">
+    <a:lvl2pPr marL="609585" algn="l" rtl="0" fontAlgn="base">
       <a:spcBef>
         <a:spcPct val="0"/>
       </a:spcBef>
       <a:spcAft>
         <a:spcPct val="0"/>
       </a:spcAft>
-      <a:defRPr sz="2400" kern="1200">
+      <a:defRPr sz="3200" kern="1200">
         <a:solidFill>
           <a:schemeClr val="tx1"/>
         </a:solidFill>
@@ -51,14 +51,14 @@
         <a:cs typeface="+mn-cs"/>
       </a:defRPr>
     </a:lvl2pPr>
-    <a:lvl3pPr marL="914400" algn="l" rtl="0" fontAlgn="base">
+    <a:lvl3pPr marL="1219170" algn="l" rtl="0" fontAlgn="base">
       <a:spcBef>
         <a:spcPct val="0"/>
       </a:spcBef>
       <a:spcAft>
         <a:spcPct val="0"/>
       </a:spcAft>
-      <a:defRPr sz="2400" kern="1200">
+      <a:defRPr sz="3200" kern="1200">
         <a:solidFill>
           <a:schemeClr val="tx1"/>
         </a:solidFill>
@@ -67,14 +67,14 @@
         <a:cs typeface="+mn-cs"/>
       </a:defRPr>
     </a:lvl3pPr>
-    <a:lvl4pPr marL="1371600" algn="l" rtl="0" fontAlgn="base">
+    <a:lvl4pPr marL="1828754" algn="l" rtl="0" fontAlgn="base">
       <a:spcBef>
         <a:spcPct val="0"/>
       </a:spcBef>
       <a:spcAft>
         <a:spcPct val="0"/>
       </a:spcAft>
-      <a:defRPr sz="2400" kern="1200">
+      <a:defRPr sz="3200" kern="1200">
         <a:solidFill>
           <a:schemeClr val="tx1"/>
         </a:solidFill>
@@ -83,14 +83,14 @@
         <a:cs typeface="+mn-cs"/>
       </a:defRPr>
     </a:lvl4pPr>
-    <a:lvl5pPr marL="1828800" algn="l" rtl="0" fontAlgn="base">
+    <a:lvl5pPr marL="2438339" algn="l" rtl="0" fontAlgn="base">
       <a:spcBef>
         <a:spcPct val="0"/>
       </a:spcBef>
       <a:spcAft>
         <a:spcPct val="0"/>
       </a:spcAft>
-      <a:defRPr sz="2400" kern="1200">
+      <a:defRPr sz="3200" kern="1200">
         <a:solidFill>
           <a:schemeClr val="tx1"/>
         </a:solidFill>
@@ -99,8 +99,8 @@
         <a:cs typeface="+mn-cs"/>
       </a:defRPr>
     </a:lvl5pPr>
-    <a:lvl6pPr marL="2286000" algn="l" defTabSz="914400" rtl="0" eaLnBrk="1" latinLnBrk="0" hangingPunct="1">
-      <a:defRPr sz="2400" kern="1200">
+    <a:lvl6pPr marL="3047924" algn="l" defTabSz="1219170" rtl="0" eaLnBrk="1" latinLnBrk="0" hangingPunct="1">
+      <a:defRPr sz="3200" kern="1200">
         <a:solidFill>
           <a:schemeClr val="tx1"/>
         </a:solidFill>
@@ -109,8 +109,8 @@
         <a:cs typeface="+mn-cs"/>
       </a:defRPr>
     </a:lvl6pPr>
-    <a:lvl7pPr marL="2743200" algn="l" defTabSz="914400" rtl="0" eaLnBrk="1" latinLnBrk="0" hangingPunct="1">
-      <a:defRPr sz="2400" kern="1200">
+    <a:lvl7pPr marL="3657509" algn="l" defTabSz="1219170" rtl="0" eaLnBrk="1" latinLnBrk="0" hangingPunct="1">
+      <a:defRPr sz="3200" kern="1200">
         <a:solidFill>
           <a:schemeClr val="tx1"/>
         </a:solidFill>
@@ -119,8 +119,8 @@
         <a:cs typeface="+mn-cs"/>
       </a:defRPr>
     </a:lvl7pPr>
-    <a:lvl8pPr marL="3200400" algn="l" defTabSz="914400" rtl="0" eaLnBrk="1" latinLnBrk="0" hangingPunct="1">
-      <a:defRPr sz="2400" kern="1200">
+    <a:lvl8pPr marL="4267093" algn="l" defTabSz="1219170" rtl="0" eaLnBrk="1" latinLnBrk="0" hangingPunct="1">
+      <a:defRPr sz="3200" kern="1200">
         <a:solidFill>
           <a:schemeClr val="tx1"/>
         </a:solidFill>
@@ -129,8 +129,8 @@
         <a:cs typeface="+mn-cs"/>
       </a:defRPr>
     </a:lvl8pPr>
-    <a:lvl9pPr marL="3657600" algn="l" defTabSz="914400" rtl="0" eaLnBrk="1" latinLnBrk="0" hangingPunct="1">
-      <a:defRPr sz="2400" kern="1200">
+    <a:lvl9pPr marL="4876678" algn="l" defTabSz="1219170" rtl="0" eaLnBrk="1" latinLnBrk="0" hangingPunct="1">
+      <a:defRPr sz="3200" kern="1200">
         <a:solidFill>
           <a:schemeClr val="tx1"/>
         </a:solidFill>
@@ -143,47 +143,47 @@
   <p:extLst>
     <p:ext uri="{EFAFB233-063F-42B5-8137-9DF3F51BA10A}">
       <p15:sldGuideLst xmlns:p15="http://schemas.microsoft.com/office/powerpoint/2012/main">
-        <p15:guide id="1" orient="horz" pos="2304">
+        <p15:guide id="1" orient="horz" pos="3072" userDrawn="1">
           <p15:clr>
             <a:srgbClr val="A4A3A4"/>
           </p15:clr>
         </p15:guide>
-        <p15:guide id="2" orient="horz" pos="480">
+        <p15:guide id="2" orient="horz" pos="640" userDrawn="1">
           <p15:clr>
             <a:srgbClr val="A4A3A4"/>
           </p15:clr>
         </p15:guide>
-        <p15:guide id="3" orient="horz" pos="4080">
+        <p15:guide id="3" orient="horz" pos="5440" userDrawn="1">
           <p15:clr>
             <a:srgbClr val="A4A3A4"/>
           </p15:clr>
         </p15:guide>
-        <p15:guide id="4" orient="horz" pos="1056">
+        <p15:guide id="4" orient="horz" pos="1408" userDrawn="1">
           <p15:clr>
             <a:srgbClr val="A4A3A4"/>
           </p15:clr>
         </p15:guide>
-        <p15:guide id="5" orient="horz" pos="4176">
+        <p15:guide id="5" orient="horz" pos="5568" userDrawn="1">
           <p15:clr>
             <a:srgbClr val="A4A3A4"/>
           </p15:clr>
         </p15:guide>
-        <p15:guide id="6" pos="2880">
+        <p15:guide id="6" pos="3840" userDrawn="1">
           <p15:clr>
             <a:srgbClr val="A4A3A4"/>
           </p15:clr>
         </p15:guide>
-        <p15:guide id="7" pos="5424">
+        <p15:guide id="7" pos="7232" userDrawn="1">
           <p15:clr>
             <a:srgbClr val="A4A3A4"/>
           </p15:clr>
         </p15:guide>
-        <p15:guide id="8" pos="384">
+        <p15:guide id="8" pos="512" userDrawn="1">
           <p15:clr>
             <a:srgbClr val="A4A3A4"/>
           </p15:clr>
         </p15:guide>
-        <p15:guide id="9" pos="192">
+        <p15:guide id="9" pos="256" userDrawn="1">
           <p15:clr>
             <a:srgbClr val="A4A3A4"/>
           </p15:clr>
@@ -288,7 +288,7 @@
             <a:fld id="{D1BE505D-A479-49F0-99EB-8087ECB0035F}" type="datetime1">
               <a:rPr lang="en-US"/>
               <a:pPr/>
-              <a:t>8/8/2016</a:t>
+              <a:t>9/8/2016</a:t>
             </a:fld>
             <a:endParaRPr lang="en-US"/>
           </a:p>
@@ -719,7 +719,7 @@
       <a:spcAft>
         <a:spcPct val="0"/>
       </a:spcAft>
-      <a:defRPr sz="1200" kern="1200">
+      <a:defRPr sz="1600" kern="1200">
         <a:solidFill>
           <a:schemeClr val="tx1"/>
         </a:solidFill>
@@ -728,14 +728,14 @@
         <a:cs typeface="ＭＳ Ｐゴシック"/>
       </a:defRPr>
     </a:lvl1pPr>
-    <a:lvl2pPr marL="457200" algn="l" rtl="0" eaLnBrk="0" fontAlgn="base" hangingPunct="0">
+    <a:lvl2pPr marL="609585" algn="l" rtl="0" eaLnBrk="0" fontAlgn="base" hangingPunct="0">
       <a:spcBef>
         <a:spcPct val="30000"/>
       </a:spcBef>
       <a:spcAft>
         <a:spcPct val="0"/>
       </a:spcAft>
-      <a:defRPr sz="1200" kern="1200">
+      <a:defRPr sz="1600" kern="1200">
         <a:solidFill>
           <a:schemeClr val="tx1"/>
         </a:solidFill>
@@ -744,14 +744,14 @@
         <a:cs typeface="ＭＳ Ｐゴシック"/>
       </a:defRPr>
     </a:lvl2pPr>
-    <a:lvl3pPr marL="914400" algn="l" rtl="0" eaLnBrk="0" fontAlgn="base" hangingPunct="0">
+    <a:lvl3pPr marL="1219170" algn="l" rtl="0" eaLnBrk="0" fontAlgn="base" hangingPunct="0">
       <a:spcBef>
         <a:spcPct val="30000"/>
       </a:spcBef>
       <a:spcAft>
         <a:spcPct val="0"/>
       </a:spcAft>
-      <a:defRPr sz="1200" kern="1200">
+      <a:defRPr sz="1600" kern="1200">
         <a:solidFill>
           <a:schemeClr val="tx1"/>
         </a:solidFill>
@@ -760,14 +760,14 @@
         <a:cs typeface="ＭＳ Ｐゴシック"/>
       </a:defRPr>
     </a:lvl3pPr>
-    <a:lvl4pPr marL="1371600" algn="l" rtl="0" eaLnBrk="0" fontAlgn="base" hangingPunct="0">
+    <a:lvl4pPr marL="1828754" algn="l" rtl="0" eaLnBrk="0" fontAlgn="base" hangingPunct="0">
       <a:spcBef>
         <a:spcPct val="30000"/>
       </a:spcBef>
       <a:spcAft>
         <a:spcPct val="0"/>
       </a:spcAft>
-      <a:defRPr sz="1200" kern="1200">
+      <a:defRPr sz="1600" kern="1200">
         <a:solidFill>
           <a:schemeClr val="tx1"/>
         </a:solidFill>
@@ -776,14 +776,14 @@
         <a:cs typeface="ＭＳ Ｐゴシック"/>
       </a:defRPr>
     </a:lvl4pPr>
-    <a:lvl5pPr marL="1828800" algn="l" rtl="0" eaLnBrk="0" fontAlgn="base" hangingPunct="0">
+    <a:lvl5pPr marL="2438339" algn="l" rtl="0" eaLnBrk="0" fontAlgn="base" hangingPunct="0">
       <a:spcBef>
         <a:spcPct val="30000"/>
       </a:spcBef>
       <a:spcAft>
         <a:spcPct val="0"/>
       </a:spcAft>
-      <a:defRPr sz="1200" kern="1200">
+      <a:defRPr sz="1600" kern="1200">
         <a:solidFill>
           <a:schemeClr val="tx1"/>
         </a:solidFill>
@@ -792,8 +792,8 @@
         <a:cs typeface="ＭＳ Ｐゴシック"/>
       </a:defRPr>
     </a:lvl5pPr>
-    <a:lvl6pPr marL="2286000" algn="l" defTabSz="914400" rtl="0" eaLnBrk="1" latinLnBrk="0" hangingPunct="1">
-      <a:defRPr sz="1200" kern="1200">
+    <a:lvl6pPr marL="3047924" algn="l" defTabSz="1219170" rtl="0" eaLnBrk="1" latinLnBrk="0" hangingPunct="1">
+      <a:defRPr sz="1600" kern="1200">
         <a:solidFill>
           <a:schemeClr val="tx1"/>
         </a:solidFill>
@@ -802,8 +802,8 @@
         <a:cs typeface="+mn-cs"/>
       </a:defRPr>
     </a:lvl6pPr>
-    <a:lvl7pPr marL="2743200" algn="l" defTabSz="914400" rtl="0" eaLnBrk="1" latinLnBrk="0" hangingPunct="1">
-      <a:defRPr sz="1200" kern="1200">
+    <a:lvl7pPr marL="3657509" algn="l" defTabSz="1219170" rtl="0" eaLnBrk="1" latinLnBrk="0" hangingPunct="1">
+      <a:defRPr sz="1600" kern="1200">
         <a:solidFill>
           <a:schemeClr val="tx1"/>
         </a:solidFill>
@@ -812,8 +812,8 @@
         <a:cs typeface="+mn-cs"/>
       </a:defRPr>
     </a:lvl7pPr>
-    <a:lvl8pPr marL="3200400" algn="l" defTabSz="914400" rtl="0" eaLnBrk="1" latinLnBrk="0" hangingPunct="1">
-      <a:defRPr sz="1200" kern="1200">
+    <a:lvl8pPr marL="4267093" algn="l" defTabSz="1219170" rtl="0" eaLnBrk="1" latinLnBrk="0" hangingPunct="1">
+      <a:defRPr sz="1600" kern="1200">
         <a:solidFill>
           <a:schemeClr val="tx1"/>
         </a:solidFill>
@@ -822,8 +822,8 @@
         <a:cs typeface="+mn-cs"/>
       </a:defRPr>
     </a:lvl8pPr>
-    <a:lvl9pPr marL="3657600" algn="l" defTabSz="914400" rtl="0" eaLnBrk="1" latinLnBrk="0" hangingPunct="1">
-      <a:defRPr sz="1200" kern="1200">
+    <a:lvl9pPr marL="4876678" algn="l" defTabSz="1219170" rtl="0" eaLnBrk="1" latinLnBrk="0" hangingPunct="1">
+      <a:defRPr sz="1600" kern="1200">
         <a:solidFill>
           <a:schemeClr val="tx1"/>
         </a:solidFill>
@@ -966,7 +966,7 @@
         <p:spPr bwMode="auto">
           <a:xfrm>
             <a:off x="0" y="0"/>
-            <a:ext cx="9144000" cy="6858000"/>
+            <a:ext cx="12192000" cy="9144000"/>
           </a:xfrm>
           <a:prstGeom prst="rect">
             <a:avLst/>
@@ -997,8 +997,8 @@
         </p:blipFill>
         <p:spPr bwMode="auto">
           <a:xfrm>
-            <a:off x="479425" y="5943600"/>
-            <a:ext cx="2187575" cy="533400"/>
+            <a:off x="639234" y="7924800"/>
+            <a:ext cx="2916767" cy="711200"/>
           </a:xfrm>
           <a:prstGeom prst="rect">
             <a:avLst/>
@@ -1024,8 +1024,8 @@
         </p:nvSpPr>
         <p:spPr>
           <a:xfrm>
-            <a:off x="0" y="3962400"/>
-            <a:ext cx="9140825" cy="609600"/>
+            <a:off x="1" y="5283200"/>
+            <a:ext cx="12187767" cy="812800"/>
           </a:xfrm>
         </p:spPr>
         <p:txBody>
@@ -1034,7 +1034,7 @@
           </a:bodyPr>
           <a:lstStyle>
             <a:lvl1pPr>
-              <a:defRPr sz="4000">
+              <a:defRPr sz="5333">
                 <a:solidFill>
                   <a:srgbClr val="3CB832"/>
                 </a:solidFill>
@@ -1094,8 +1094,8 @@
         </p:nvSpPr>
         <p:spPr>
           <a:xfrm>
-            <a:off x="6705600" y="1066800"/>
-            <a:ext cx="2133600" cy="5257800"/>
+            <a:off x="8940800" y="1422400"/>
+            <a:ext cx="2844800" cy="7010400"/>
           </a:xfrm>
           <a:prstGeom prst="rect">
             <a:avLst/>
@@ -1133,8 +1133,8 @@
         </p:nvSpPr>
         <p:spPr>
           <a:xfrm>
-            <a:off x="304800" y="1066800"/>
-            <a:ext cx="6248400" cy="5257800"/>
+            <a:off x="406400" y="1422400"/>
+            <a:ext cx="8331200" cy="7010400"/>
           </a:xfrm>
         </p:spPr>
         <p:txBody>
@@ -1310,25 +1310,25 @@
               <a:buBlip>
                 <a:blip r:embed="rId2"/>
               </a:buBlip>
-              <a:defRPr sz="1600"/>
+              <a:defRPr sz="2133"/>
             </a:lvl1pPr>
-            <a:lvl2pPr marL="627063" indent="-269875">
+            <a:lvl2pPr marL="836063" indent="-359824">
               <a:buClrTx/>
               <a:buFont typeface="Wingdings" charset="2"/>
               <a:buChar char="§"/>
-              <a:defRPr sz="1600"/>
+              <a:defRPr sz="2133"/>
             </a:lvl2pPr>
-            <a:lvl3pPr marL="895350" indent="-268288">
+            <a:lvl3pPr marL="1193770" indent="-357708">
               <a:buClrTx/>
-              <a:defRPr sz="1400"/>
+              <a:defRPr sz="1867"/>
             </a:lvl3pPr>
-            <a:lvl4pPr marL="1165225" indent="-269875">
+            <a:lvl4pPr marL="1553594" indent="-359824">
               <a:buClrTx/>
-              <a:defRPr sz="1400"/>
+              <a:defRPr sz="1867"/>
             </a:lvl4pPr>
-            <a:lvl5pPr marL="1435100" indent="-269875">
+            <a:lvl5pPr marL="1913419" indent="-359824">
               <a:buClrTx/>
-              <a:defRPr sz="1400"/>
+              <a:defRPr sz="1867"/>
             </a:lvl5pPr>
           </a:lstStyle>
           <a:p>
@@ -1381,8 +1381,8 @@
         </p:nvSpPr>
         <p:spPr>
           <a:xfrm>
-            <a:off x="0" y="1022350"/>
-            <a:ext cx="9144000" cy="457200"/>
+            <a:off x="0" y="1363133"/>
+            <a:ext cx="12192000" cy="609600"/>
           </a:xfrm>
           <a:prstGeom prst="rect">
             <a:avLst/>
@@ -1392,7 +1392,7 @@
           <a:bodyPr/>
           <a:lstStyle>
             <a:lvl1pPr>
-              <a:defRPr sz="2400">
+              <a:defRPr sz="3200">
                 <a:solidFill>
                   <a:schemeClr val="tx1"/>
                 </a:solidFill>
@@ -1420,8 +1420,8 @@
         </p:nvSpPr>
         <p:spPr>
           <a:xfrm>
-            <a:off x="0" y="766041"/>
-            <a:ext cx="630382" cy="228600"/>
+            <a:off x="0" y="1021388"/>
+            <a:ext cx="840509" cy="304800"/>
           </a:xfrm>
           <a:ln/>
         </p:spPr>
@@ -1429,7 +1429,7 @@
           <a:bodyPr/>
           <a:lstStyle>
             <a:lvl1pPr>
-              <a:defRPr sz="800">
+              <a:defRPr sz="1067">
                 <a:latin typeface="+mn-lt"/>
               </a:defRPr>
             </a:lvl1pPr>
@@ -1454,8 +1454,8 @@
         </p:nvSpPr>
         <p:spPr>
           <a:xfrm>
-            <a:off x="2209800" y="685799"/>
-            <a:ext cx="1371600" cy="276225"/>
+            <a:off x="2946400" y="914399"/>
+            <a:ext cx="1828800" cy="368300"/>
           </a:xfrm>
           <a:ln/>
         </p:spPr>
@@ -1488,8 +1488,8 @@
         </p:nvSpPr>
         <p:spPr>
           <a:xfrm>
-            <a:off x="762000" y="766041"/>
-            <a:ext cx="838200" cy="228600"/>
+            <a:off x="1016000" y="1021388"/>
+            <a:ext cx="1117600" cy="304800"/>
           </a:xfrm>
           <a:ln/>
         </p:spPr>
@@ -1560,8 +1560,8 @@
         </p:nvSpPr>
         <p:spPr>
           <a:xfrm>
-            <a:off x="304800" y="4406900"/>
-            <a:ext cx="8189913" cy="1362075"/>
+            <a:off x="406401" y="5875867"/>
+            <a:ext cx="10919884" cy="1816100"/>
           </a:xfrm>
           <a:prstGeom prst="rect">
             <a:avLst/>
@@ -1571,7 +1571,7 @@
           <a:bodyPr anchor="t"/>
           <a:lstStyle>
             <a:lvl1pPr algn="l">
-              <a:defRPr sz="4000" b="1" cap="all">
+              <a:defRPr sz="5333" b="1" cap="all">
                 <a:solidFill>
                   <a:srgbClr val="000000"/>
                 </a:solidFill>
@@ -1599,8 +1599,8 @@
         </p:nvSpPr>
         <p:spPr>
           <a:xfrm>
-            <a:off x="304800" y="2906713"/>
-            <a:ext cx="8189913" cy="1500187"/>
+            <a:off x="406401" y="3875618"/>
+            <a:ext cx="10919884" cy="2000249"/>
           </a:xfrm>
         </p:spPr>
         <p:txBody>
@@ -1608,39 +1608,39 @@
           <a:lstStyle>
             <a:lvl1pPr marL="0" indent="0">
               <a:buNone/>
-              <a:defRPr sz="2000"/>
+              <a:defRPr sz="2667"/>
             </a:lvl1pPr>
-            <a:lvl2pPr marL="457200" indent="0">
+            <a:lvl2pPr marL="609585" indent="0">
               <a:buNone/>
-              <a:defRPr sz="1800"/>
+              <a:defRPr sz="2400"/>
             </a:lvl2pPr>
-            <a:lvl3pPr marL="914400" indent="0">
+            <a:lvl3pPr marL="1219170" indent="0">
               <a:buNone/>
-              <a:defRPr sz="1600"/>
+              <a:defRPr sz="2133"/>
             </a:lvl3pPr>
-            <a:lvl4pPr marL="1371600" indent="0">
+            <a:lvl4pPr marL="1828754" indent="0">
               <a:buNone/>
-              <a:defRPr sz="1400"/>
+              <a:defRPr sz="1867"/>
             </a:lvl4pPr>
-            <a:lvl5pPr marL="1828800" indent="0">
+            <a:lvl5pPr marL="2438339" indent="0">
               <a:buNone/>
-              <a:defRPr sz="1400"/>
+              <a:defRPr sz="1867"/>
             </a:lvl5pPr>
-            <a:lvl6pPr marL="2286000" indent="0">
+            <a:lvl6pPr marL="3047924" indent="0">
               <a:buNone/>
-              <a:defRPr sz="1400"/>
+              <a:defRPr sz="1867"/>
             </a:lvl6pPr>
-            <a:lvl7pPr marL="2743200" indent="0">
+            <a:lvl7pPr marL="3657509" indent="0">
               <a:buNone/>
-              <a:defRPr sz="1400"/>
+              <a:defRPr sz="1867"/>
             </a:lvl7pPr>
-            <a:lvl8pPr marL="3200400" indent="0">
+            <a:lvl8pPr marL="4267093" indent="0">
               <a:buNone/>
-              <a:defRPr sz="1400"/>
+              <a:defRPr sz="1867"/>
             </a:lvl8pPr>
-            <a:lvl9pPr marL="3657600" indent="0">
+            <a:lvl9pPr marL="4876678" indent="0">
               <a:buNone/>
-              <a:defRPr sz="1400"/>
+              <a:defRPr sz="1867"/>
             </a:lvl9pPr>
           </a:lstStyle>
           <a:p>
@@ -1782,44 +1782,44 @@
         </p:nvSpPr>
         <p:spPr>
           <a:xfrm>
-            <a:off x="228600" y="1600200"/>
-            <a:ext cx="4152900" cy="4572000"/>
+            <a:off x="304800" y="2133600"/>
+            <a:ext cx="5537200" cy="6096000"/>
           </a:xfrm>
         </p:spPr>
         <p:txBody>
           <a:bodyPr/>
           <a:lstStyle>
             <a:lvl1pPr>
-              <a:defRPr sz="1600"/>
+              <a:defRPr sz="2133"/>
             </a:lvl1pPr>
-            <a:lvl2pPr marL="536575" indent="-273050">
+            <a:lvl2pPr marL="715415" indent="-364058">
               <a:buFont typeface="Wingdings" charset="2"/>
               <a:buChar char="§"/>
-              <a:defRPr sz="1600"/>
+              <a:defRPr sz="2133"/>
             </a:lvl2pPr>
-            <a:lvl3pPr marL="811213" indent="-274638">
-              <a:defRPr sz="1400"/>
+            <a:lvl3pPr marL="1081590" indent="-366175">
+              <a:defRPr sz="1867"/>
             </a:lvl3pPr>
-            <a:lvl4pPr marL="1077913" indent="-266700">
+            <a:lvl4pPr marL="1437181" indent="-355591">
               <a:tabLst>
-                <a:tab pos="1162050" algn="l"/>
+                <a:tab pos="1549361" algn="l"/>
               </a:tabLst>
-              <a:defRPr sz="1400"/>
+              <a:defRPr sz="1867"/>
             </a:lvl4pPr>
-            <a:lvl5pPr marL="1347788" indent="-273050">
-              <a:defRPr sz="1400"/>
+            <a:lvl5pPr marL="1797006" indent="-364058">
+              <a:defRPr sz="1867"/>
             </a:lvl5pPr>
             <a:lvl6pPr>
-              <a:defRPr sz="1800"/>
+              <a:defRPr sz="2400"/>
             </a:lvl6pPr>
             <a:lvl7pPr>
-              <a:defRPr sz="1800"/>
+              <a:defRPr sz="2400"/>
             </a:lvl7pPr>
             <a:lvl8pPr>
-              <a:defRPr sz="1800"/>
+              <a:defRPr sz="2400"/>
             </a:lvl8pPr>
             <a:lvl9pPr>
-              <a:defRPr sz="1800"/>
+              <a:defRPr sz="2400"/>
             </a:lvl9pPr>
           </a:lstStyle>
           <a:p>
@@ -1872,8 +1872,8 @@
         </p:nvSpPr>
         <p:spPr>
           <a:xfrm>
-            <a:off x="0" y="1022350"/>
-            <a:ext cx="9144000" cy="457200"/>
+            <a:off x="0" y="1363133"/>
+            <a:ext cx="12192000" cy="609600"/>
           </a:xfrm>
           <a:prstGeom prst="rect">
             <a:avLst/>
@@ -1883,7 +1883,7 @@
           <a:bodyPr/>
           <a:lstStyle>
             <a:lvl1pPr>
-              <a:defRPr sz="2400">
+              <a:defRPr sz="3200">
                 <a:solidFill>
                   <a:srgbClr val="000000"/>
                 </a:solidFill>
@@ -1911,44 +1911,44 @@
         </p:nvSpPr>
         <p:spPr>
           <a:xfrm>
-            <a:off x="4610100" y="1619738"/>
-            <a:ext cx="4152900" cy="4572000"/>
+            <a:off x="6146800" y="2159651"/>
+            <a:ext cx="5537200" cy="6096000"/>
           </a:xfrm>
         </p:spPr>
         <p:txBody>
           <a:bodyPr/>
           <a:lstStyle>
             <a:lvl1pPr>
-              <a:defRPr sz="1600"/>
+              <a:defRPr sz="2133"/>
             </a:lvl1pPr>
-            <a:lvl2pPr marL="536575" indent="-273050">
+            <a:lvl2pPr marL="715415" indent="-364058">
               <a:buFont typeface="Wingdings" charset="2"/>
               <a:buChar char="§"/>
-              <a:defRPr sz="1600"/>
+              <a:defRPr sz="2133"/>
             </a:lvl2pPr>
-            <a:lvl3pPr marL="811213" indent="-274638">
-              <a:defRPr sz="1400"/>
+            <a:lvl3pPr marL="1081590" indent="-366175">
+              <a:defRPr sz="1867"/>
             </a:lvl3pPr>
-            <a:lvl4pPr marL="1077913" indent="-266700">
+            <a:lvl4pPr marL="1437181" indent="-355591">
               <a:tabLst>
-                <a:tab pos="1162050" algn="l"/>
+                <a:tab pos="1549361" algn="l"/>
               </a:tabLst>
-              <a:defRPr sz="1400"/>
+              <a:defRPr sz="1867"/>
             </a:lvl4pPr>
-            <a:lvl5pPr marL="1347788" indent="-273050">
-              <a:defRPr sz="1400"/>
+            <a:lvl5pPr marL="1797006" indent="-364058">
+              <a:defRPr sz="1867"/>
             </a:lvl5pPr>
             <a:lvl6pPr>
-              <a:defRPr sz="1800"/>
+              <a:defRPr sz="2400"/>
             </a:lvl6pPr>
             <a:lvl7pPr>
-              <a:defRPr sz="1800"/>
+              <a:defRPr sz="2400"/>
             </a:lvl7pPr>
             <a:lvl8pPr>
-              <a:defRPr sz="1800"/>
+              <a:defRPr sz="2400"/>
             </a:lvl8pPr>
             <a:lvl9pPr>
-              <a:defRPr sz="1800"/>
+              <a:defRPr sz="2400"/>
             </a:lvl9pPr>
           </a:lstStyle>
           <a:p>
@@ -2112,8 +2112,8 @@
         </p:nvSpPr>
         <p:spPr>
           <a:xfrm>
-            <a:off x="0" y="1022350"/>
-            <a:ext cx="9144000" cy="457200"/>
+            <a:off x="0" y="1363133"/>
+            <a:ext cx="12192000" cy="609600"/>
           </a:xfrm>
           <a:prstGeom prst="rect">
             <a:avLst/>
@@ -2123,7 +2123,7 @@
           <a:bodyPr/>
           <a:lstStyle>
             <a:lvl1pPr>
-              <a:defRPr sz="2400">
+              <a:defRPr sz="3200">
                 <a:solidFill>
                   <a:srgbClr val="000000"/>
                 </a:solidFill>
@@ -2373,8 +2373,8 @@
         </p:nvSpPr>
         <p:spPr>
           <a:xfrm>
-            <a:off x="228600" y="1066800"/>
-            <a:ext cx="3008313" cy="1162050"/>
+            <a:off x="304801" y="1422400"/>
+            <a:ext cx="4011084" cy="1549400"/>
           </a:xfrm>
           <a:prstGeom prst="rect">
             <a:avLst/>
@@ -2384,7 +2384,7 @@
           <a:bodyPr anchor="b"/>
           <a:lstStyle>
             <a:lvl1pPr algn="l">
-              <a:defRPr sz="2000" b="1">
+              <a:defRPr sz="2667" b="1">
                 <a:solidFill>
                   <a:srgbClr val="000000"/>
                 </a:solidFill>
@@ -2412,39 +2412,39 @@
         </p:nvSpPr>
         <p:spPr>
           <a:xfrm>
-            <a:off x="3346450" y="1066800"/>
-            <a:ext cx="5111750" cy="5853113"/>
+            <a:off x="4461933" y="1422401"/>
+            <a:ext cx="6815667" cy="7804151"/>
           </a:xfrm>
         </p:spPr>
         <p:txBody>
           <a:bodyPr/>
           <a:lstStyle>
             <a:lvl1pPr>
-              <a:defRPr sz="3200"/>
+              <a:defRPr sz="4267"/>
             </a:lvl1pPr>
             <a:lvl2pPr>
-              <a:defRPr sz="2800"/>
+              <a:defRPr sz="3733"/>
             </a:lvl2pPr>
             <a:lvl3pPr>
-              <a:defRPr sz="2400"/>
+              <a:defRPr sz="3200"/>
             </a:lvl3pPr>
             <a:lvl4pPr>
-              <a:defRPr sz="2000"/>
+              <a:defRPr sz="2667"/>
             </a:lvl4pPr>
             <a:lvl5pPr>
-              <a:defRPr sz="2000"/>
+              <a:defRPr sz="2667"/>
             </a:lvl5pPr>
             <a:lvl6pPr>
-              <a:defRPr sz="2000"/>
+              <a:defRPr sz="2667"/>
             </a:lvl6pPr>
             <a:lvl7pPr>
-              <a:defRPr sz="2000"/>
+              <a:defRPr sz="2667"/>
             </a:lvl7pPr>
             <a:lvl8pPr>
-              <a:defRPr sz="2000"/>
+              <a:defRPr sz="2667"/>
             </a:lvl8pPr>
             <a:lvl9pPr>
-              <a:defRPr sz="2000"/>
+              <a:defRPr sz="2667"/>
             </a:lvl9pPr>
           </a:lstStyle>
           <a:p>
@@ -2497,8 +2497,8 @@
         </p:nvSpPr>
         <p:spPr>
           <a:xfrm>
-            <a:off x="228600" y="2228850"/>
-            <a:ext cx="3008313" cy="4691063"/>
+            <a:off x="304801" y="2971801"/>
+            <a:ext cx="4011084" cy="6254751"/>
           </a:xfrm>
         </p:spPr>
         <p:txBody>
@@ -2506,39 +2506,39 @@
           <a:lstStyle>
             <a:lvl1pPr marL="0" indent="0">
               <a:buNone/>
-              <a:defRPr sz="1400"/>
+              <a:defRPr sz="1867"/>
             </a:lvl1pPr>
-            <a:lvl2pPr marL="457200" indent="0">
+            <a:lvl2pPr marL="609585" indent="0">
+              <a:buNone/>
+              <a:defRPr sz="1600"/>
+            </a:lvl2pPr>
+            <a:lvl3pPr marL="1219170" indent="0">
+              <a:buNone/>
+              <a:defRPr sz="1333"/>
+            </a:lvl3pPr>
+            <a:lvl4pPr marL="1828754" indent="0">
               <a:buNone/>
               <a:defRPr sz="1200"/>
-            </a:lvl2pPr>
-            <a:lvl3pPr marL="914400" indent="0">
+            </a:lvl4pPr>
+            <a:lvl5pPr marL="2438339" indent="0">
               <a:buNone/>
-              <a:defRPr sz="1000"/>
-            </a:lvl3pPr>
-            <a:lvl4pPr marL="1371600" indent="0">
+              <a:defRPr sz="1200"/>
+            </a:lvl5pPr>
+            <a:lvl6pPr marL="3047924" indent="0">
               <a:buNone/>
-              <a:defRPr sz="900"/>
-            </a:lvl4pPr>
-            <a:lvl5pPr marL="1828800" indent="0">
+              <a:defRPr sz="1200"/>
+            </a:lvl6pPr>
+            <a:lvl7pPr marL="3657509" indent="0">
               <a:buNone/>
-              <a:defRPr sz="900"/>
-            </a:lvl5pPr>
-            <a:lvl6pPr marL="2286000" indent="0">
+              <a:defRPr sz="1200"/>
+            </a:lvl7pPr>
+            <a:lvl8pPr marL="4267093" indent="0">
               <a:buNone/>
-              <a:defRPr sz="900"/>
-            </a:lvl6pPr>
-            <a:lvl7pPr marL="2743200" indent="0">
+              <a:defRPr sz="1200"/>
+            </a:lvl8pPr>
+            <a:lvl9pPr marL="4876678" indent="0">
               <a:buNone/>
-              <a:defRPr sz="900"/>
-            </a:lvl7pPr>
-            <a:lvl8pPr marL="3200400" indent="0">
-              <a:buNone/>
-              <a:defRPr sz="900"/>
-            </a:lvl8pPr>
-            <a:lvl9pPr marL="3657600" indent="0">
-              <a:buNone/>
-              <a:defRPr sz="900"/>
+              <a:defRPr sz="1200"/>
             </a:lvl9pPr>
           </a:lstStyle>
           <a:p>
@@ -2673,8 +2673,8 @@
         </p:nvSpPr>
         <p:spPr>
           <a:xfrm>
-            <a:off x="1792288" y="4800600"/>
-            <a:ext cx="5486400" cy="566738"/>
+            <a:off x="2389717" y="6400800"/>
+            <a:ext cx="7315200" cy="755651"/>
           </a:xfrm>
           <a:prstGeom prst="rect">
             <a:avLst/>
@@ -2684,7 +2684,7 @@
           <a:bodyPr anchor="b"/>
           <a:lstStyle>
             <a:lvl1pPr algn="l">
-              <a:defRPr sz="2000" b="1">
+              <a:defRPr sz="2667" b="1">
                 <a:solidFill>
                   <a:srgbClr val="000000"/>
                 </a:solidFill>
@@ -2712,8 +2712,8 @@
         </p:nvSpPr>
         <p:spPr>
           <a:xfrm>
-            <a:off x="1792288" y="914400"/>
-            <a:ext cx="5486400" cy="4114800"/>
+            <a:off x="2389717" y="1219200"/>
+            <a:ext cx="7315200" cy="5486400"/>
           </a:xfrm>
         </p:spPr>
         <p:txBody>
@@ -2721,39 +2721,39 @@
           <a:lstStyle>
             <a:lvl1pPr marL="0" indent="0">
               <a:buNone/>
+              <a:defRPr sz="4267"/>
+            </a:lvl1pPr>
+            <a:lvl2pPr marL="609585" indent="0">
+              <a:buNone/>
+              <a:defRPr sz="3733"/>
+            </a:lvl2pPr>
+            <a:lvl3pPr marL="1219170" indent="0">
+              <a:buNone/>
               <a:defRPr sz="3200"/>
-            </a:lvl1pPr>
-            <a:lvl2pPr marL="457200" indent="0">
+            </a:lvl3pPr>
+            <a:lvl4pPr marL="1828754" indent="0">
               <a:buNone/>
-              <a:defRPr sz="2800"/>
-            </a:lvl2pPr>
-            <a:lvl3pPr marL="914400" indent="0">
+              <a:defRPr sz="2667"/>
+            </a:lvl4pPr>
+            <a:lvl5pPr marL="2438339" indent="0">
               <a:buNone/>
-              <a:defRPr sz="2400"/>
-            </a:lvl3pPr>
-            <a:lvl4pPr marL="1371600" indent="0">
+              <a:defRPr sz="2667"/>
+            </a:lvl5pPr>
+            <a:lvl6pPr marL="3047924" indent="0">
               <a:buNone/>
-              <a:defRPr sz="2000"/>
-            </a:lvl4pPr>
-            <a:lvl5pPr marL="1828800" indent="0">
+              <a:defRPr sz="2667"/>
+            </a:lvl6pPr>
+            <a:lvl7pPr marL="3657509" indent="0">
               <a:buNone/>
-              <a:defRPr sz="2000"/>
-            </a:lvl5pPr>
-            <a:lvl6pPr marL="2286000" indent="0">
+              <a:defRPr sz="2667"/>
+            </a:lvl7pPr>
+            <a:lvl8pPr marL="4267093" indent="0">
               <a:buNone/>
-              <a:defRPr sz="2000"/>
-            </a:lvl6pPr>
-            <a:lvl7pPr marL="2743200" indent="0">
+              <a:defRPr sz="2667"/>
+            </a:lvl8pPr>
+            <a:lvl9pPr marL="4876678" indent="0">
               <a:buNone/>
-              <a:defRPr sz="2000"/>
-            </a:lvl7pPr>
-            <a:lvl8pPr marL="3200400" indent="0">
-              <a:buNone/>
-              <a:defRPr sz="2000"/>
-            </a:lvl8pPr>
-            <a:lvl9pPr marL="3657600" indent="0">
-              <a:buNone/>
-              <a:defRPr sz="2000"/>
+              <a:defRPr sz="2667"/>
             </a:lvl9pPr>
           </a:lstStyle>
           <a:p>
@@ -2778,8 +2778,8 @@
         </p:nvSpPr>
         <p:spPr>
           <a:xfrm>
-            <a:off x="1792288" y="5367338"/>
-            <a:ext cx="5486400" cy="804862"/>
+            <a:off x="2389717" y="7156451"/>
+            <a:ext cx="7315200" cy="1073149"/>
           </a:xfrm>
         </p:spPr>
         <p:txBody>
@@ -2787,39 +2787,39 @@
           <a:lstStyle>
             <a:lvl1pPr marL="0" indent="0">
               <a:buNone/>
-              <a:defRPr sz="1400"/>
+              <a:defRPr sz="1867"/>
             </a:lvl1pPr>
-            <a:lvl2pPr marL="457200" indent="0">
+            <a:lvl2pPr marL="609585" indent="0">
+              <a:buNone/>
+              <a:defRPr sz="1600"/>
+            </a:lvl2pPr>
+            <a:lvl3pPr marL="1219170" indent="0">
+              <a:buNone/>
+              <a:defRPr sz="1333"/>
+            </a:lvl3pPr>
+            <a:lvl4pPr marL="1828754" indent="0">
               <a:buNone/>
               <a:defRPr sz="1200"/>
-            </a:lvl2pPr>
-            <a:lvl3pPr marL="914400" indent="0">
+            </a:lvl4pPr>
+            <a:lvl5pPr marL="2438339" indent="0">
               <a:buNone/>
-              <a:defRPr sz="1000"/>
-            </a:lvl3pPr>
-            <a:lvl4pPr marL="1371600" indent="0">
+              <a:defRPr sz="1200"/>
+            </a:lvl5pPr>
+            <a:lvl6pPr marL="3047924" indent="0">
               <a:buNone/>
-              <a:defRPr sz="900"/>
-            </a:lvl4pPr>
-            <a:lvl5pPr marL="1828800" indent="0">
+              <a:defRPr sz="1200"/>
+            </a:lvl6pPr>
+            <a:lvl7pPr marL="3657509" indent="0">
               <a:buNone/>
-              <a:defRPr sz="900"/>
-            </a:lvl5pPr>
-            <a:lvl6pPr marL="2286000" indent="0">
+              <a:defRPr sz="1200"/>
+            </a:lvl7pPr>
+            <a:lvl8pPr marL="4267093" indent="0">
               <a:buNone/>
-              <a:defRPr sz="900"/>
-            </a:lvl6pPr>
-            <a:lvl7pPr marL="2743200" indent="0">
+              <a:defRPr sz="1200"/>
+            </a:lvl8pPr>
+            <a:lvl9pPr marL="4876678" indent="0">
               <a:buNone/>
-              <a:defRPr sz="900"/>
-            </a:lvl7pPr>
-            <a:lvl8pPr marL="3200400" indent="0">
-              <a:buNone/>
-              <a:defRPr sz="900"/>
-            </a:lvl8pPr>
-            <a:lvl9pPr marL="3657600" indent="0">
-              <a:buNone/>
-              <a:defRPr sz="900"/>
+              <a:defRPr sz="1200"/>
             </a:lvl9pPr>
           </a:lstStyle>
           <a:p>
@@ -2954,8 +2954,8 @@
         </p:nvSpPr>
         <p:spPr>
           <a:xfrm>
-            <a:off x="304800" y="1828800"/>
-            <a:ext cx="8839200" cy="4419600"/>
+            <a:off x="406400" y="2438400"/>
+            <a:ext cx="11785600" cy="5892800"/>
           </a:xfrm>
         </p:spPr>
         <p:txBody>
@@ -3011,8 +3011,8 @@
         </p:nvSpPr>
         <p:spPr>
           <a:xfrm>
-            <a:off x="0" y="1022350"/>
-            <a:ext cx="9144000" cy="457200"/>
+            <a:off x="0" y="1363133"/>
+            <a:ext cx="12192000" cy="609600"/>
           </a:xfrm>
           <a:prstGeom prst="rect">
             <a:avLst/>
@@ -3022,7 +3022,7 @@
           <a:bodyPr/>
           <a:lstStyle>
             <a:lvl1pPr>
-              <a:defRPr sz="2400">
+              <a:defRPr sz="3200">
                 <a:solidFill>
                   <a:srgbClr val="000000"/>
                 </a:solidFill>
@@ -3174,8 +3174,8 @@
         </p:blipFill>
         <p:spPr bwMode="auto">
           <a:xfrm>
-            <a:off x="1588" y="0"/>
-            <a:ext cx="9140825" cy="814388"/>
+            <a:off x="2118" y="0"/>
+            <a:ext cx="12187767" cy="1085851"/>
           </a:xfrm>
           <a:prstGeom prst="rect">
             <a:avLst/>
@@ -3201,8 +3201,8 @@
         </p:nvSpPr>
         <p:spPr bwMode="auto">
           <a:xfrm>
-            <a:off x="304800" y="1600200"/>
-            <a:ext cx="8839200" cy="4419600"/>
+            <a:off x="406400" y="2133600"/>
+            <a:ext cx="11785600" cy="5892800"/>
           </a:xfrm>
           <a:prstGeom prst="rect">
             <a:avLst/>
@@ -3271,8 +3271,8 @@
         </p:nvSpPr>
         <p:spPr bwMode="auto">
           <a:xfrm>
-            <a:off x="0" y="723900"/>
-            <a:ext cx="533400" cy="228600"/>
+            <a:off x="0" y="965200"/>
+            <a:ext cx="711200" cy="304800"/>
           </a:xfrm>
           <a:prstGeom prst="rect">
             <a:avLst/>
@@ -3293,7 +3293,7 @@
           </a:bodyPr>
           <a:lstStyle>
             <a:lvl1pPr eaLnBrk="0" hangingPunct="0">
-              <a:defRPr sz="800">
+              <a:defRPr sz="1067">
                 <a:latin typeface="+mn-lt"/>
                 <a:ea typeface="ＭＳ Ｐゴシック" pitchFamily="-33" charset="-128"/>
                 <a:cs typeface="+mn-cs"/>
@@ -3320,8 +3320,8 @@
         </p:nvSpPr>
         <p:spPr bwMode="auto">
           <a:xfrm>
-            <a:off x="1358276" y="642720"/>
-            <a:ext cx="1176699" cy="309780"/>
+            <a:off x="1811035" y="856960"/>
+            <a:ext cx="1568932" cy="413040"/>
           </a:xfrm>
           <a:prstGeom prst="rect">
             <a:avLst/>
@@ -3342,7 +3342,7 @@
           </a:bodyPr>
           <a:lstStyle>
             <a:lvl1pPr algn="ctr" eaLnBrk="0" hangingPunct="0">
-              <a:defRPr sz="1200">
+              <a:defRPr sz="1600">
                 <a:solidFill>
                   <a:srgbClr val="3CB832"/>
                 </a:solidFill>
@@ -3370,8 +3370,8 @@
         </p:nvSpPr>
         <p:spPr bwMode="auto">
           <a:xfrm>
-            <a:off x="513014" y="723900"/>
-            <a:ext cx="762000" cy="228600"/>
+            <a:off x="684019" y="965200"/>
+            <a:ext cx="1016000" cy="304800"/>
           </a:xfrm>
           <a:prstGeom prst="rect">
             <a:avLst/>
@@ -3392,7 +3392,7 @@
           </a:bodyPr>
           <a:lstStyle>
             <a:lvl1pPr algn="r" eaLnBrk="0" hangingPunct="0">
-              <a:defRPr sz="1000">
+              <a:defRPr sz="1333">
                 <a:latin typeface="+mn-lt"/>
               </a:defRPr>
             </a:lvl1pPr>
@@ -3421,8 +3421,8 @@
         </p:nvSpPr>
         <p:spPr bwMode="auto">
           <a:xfrm>
-            <a:off x="6388100" y="790575"/>
-            <a:ext cx="2755900" cy="228600"/>
+            <a:off x="8517467" y="1054100"/>
+            <a:ext cx="3674533" cy="304800"/>
           </a:xfrm>
           <a:prstGeom prst="rect">
             <a:avLst/>
@@ -3443,7 +3443,7 @@
               <a:defRPr/>
             </a:pPr>
             <a:r>
-              <a:rPr lang="en-US" sz="900" b="1" dirty="0">
+              <a:rPr lang="en-US" sz="1200" b="1" dirty="0">
                 <a:solidFill>
                   <a:schemeClr val="bg2"/>
                 </a:solidFill>
@@ -3473,8 +3473,8 @@
         </p:blipFill>
         <p:spPr bwMode="auto">
           <a:xfrm>
-            <a:off x="381000" y="152400"/>
-            <a:ext cx="2187575" cy="533400"/>
+            <a:off x="508001" y="203200"/>
+            <a:ext cx="2916767" cy="711200"/>
           </a:xfrm>
           <a:prstGeom prst="rect">
             <a:avLst/>
@@ -3500,8 +3500,8 @@
         </p:nvSpPr>
         <p:spPr>
           <a:xfrm>
-            <a:off x="0" y="1008501"/>
-            <a:ext cx="9140825" cy="428625"/>
+            <a:off x="1" y="1344669"/>
+            <a:ext cx="12187767" cy="571500"/>
           </a:xfrm>
           <a:prstGeom prst="rect">
             <a:avLst/>
@@ -3553,7 +3553,7 @@
         <a:spcAft>
           <a:spcPct val="0"/>
         </a:spcAft>
-        <a:defRPr sz="2400" b="1">
+        <a:defRPr sz="3200" b="1">
           <a:solidFill>
             <a:schemeClr val="tx1"/>
           </a:solidFill>
@@ -3569,7 +3569,7 @@
         <a:spcAft>
           <a:spcPct val="0"/>
         </a:spcAft>
-        <a:defRPr sz="2400" b="1">
+        <a:defRPr sz="3200" b="1">
           <a:solidFill>
             <a:srgbClr val="008000"/>
           </a:solidFill>
@@ -3585,7 +3585,7 @@
         <a:spcAft>
           <a:spcPct val="0"/>
         </a:spcAft>
-        <a:defRPr sz="2400" b="1">
+        <a:defRPr sz="3200" b="1">
           <a:solidFill>
             <a:srgbClr val="008000"/>
           </a:solidFill>
@@ -3601,7 +3601,7 @@
         <a:spcAft>
           <a:spcPct val="0"/>
         </a:spcAft>
-        <a:defRPr sz="2400" b="1">
+        <a:defRPr sz="3200" b="1">
           <a:solidFill>
             <a:srgbClr val="008000"/>
           </a:solidFill>
@@ -3617,7 +3617,7 @@
         <a:spcAft>
           <a:spcPct val="0"/>
         </a:spcAft>
-        <a:defRPr sz="2400" b="1">
+        <a:defRPr sz="3200" b="1">
           <a:solidFill>
             <a:srgbClr val="008000"/>
           </a:solidFill>
@@ -3626,14 +3626,14 @@
           <a:cs typeface="ＭＳ Ｐゴシック"/>
         </a:defRPr>
       </a:lvl5pPr>
-      <a:lvl6pPr marL="457200" algn="ctr" rtl="0" eaLnBrk="1" fontAlgn="base" hangingPunct="1">
+      <a:lvl6pPr marL="609585" algn="ctr" rtl="0" eaLnBrk="1" fontAlgn="base" hangingPunct="1">
         <a:spcBef>
           <a:spcPct val="0"/>
         </a:spcBef>
         <a:spcAft>
           <a:spcPct val="0"/>
         </a:spcAft>
-        <a:defRPr sz="2400" b="1">
+        <a:defRPr sz="3200" b="1">
           <a:solidFill>
             <a:srgbClr val="000076"/>
           </a:solidFill>
@@ -3641,14 +3641,14 @@
           <a:ea typeface="ＭＳ Ｐゴシック" pitchFamily="-33" charset="-128"/>
         </a:defRPr>
       </a:lvl6pPr>
-      <a:lvl7pPr marL="914400" algn="ctr" rtl="0" eaLnBrk="1" fontAlgn="base" hangingPunct="1">
+      <a:lvl7pPr marL="1219170" algn="ctr" rtl="0" eaLnBrk="1" fontAlgn="base" hangingPunct="1">
         <a:spcBef>
           <a:spcPct val="0"/>
         </a:spcBef>
         <a:spcAft>
           <a:spcPct val="0"/>
         </a:spcAft>
-        <a:defRPr sz="2400" b="1">
+        <a:defRPr sz="3200" b="1">
           <a:solidFill>
             <a:srgbClr val="000076"/>
           </a:solidFill>
@@ -3656,14 +3656,14 @@
           <a:ea typeface="ＭＳ Ｐゴシック" pitchFamily="-33" charset="-128"/>
         </a:defRPr>
       </a:lvl7pPr>
-      <a:lvl8pPr marL="1371600" algn="ctr" rtl="0" eaLnBrk="1" fontAlgn="base" hangingPunct="1">
+      <a:lvl8pPr marL="1828754" algn="ctr" rtl="0" eaLnBrk="1" fontAlgn="base" hangingPunct="1">
         <a:spcBef>
           <a:spcPct val="0"/>
         </a:spcBef>
         <a:spcAft>
           <a:spcPct val="0"/>
         </a:spcAft>
-        <a:defRPr sz="2400" b="1">
+        <a:defRPr sz="3200" b="1">
           <a:solidFill>
             <a:srgbClr val="000076"/>
           </a:solidFill>
@@ -3671,14 +3671,14 @@
           <a:ea typeface="ＭＳ Ｐゴシック" pitchFamily="-33" charset="-128"/>
         </a:defRPr>
       </a:lvl8pPr>
-      <a:lvl9pPr marL="1828800" algn="ctr" rtl="0" eaLnBrk="1" fontAlgn="base" hangingPunct="1">
+      <a:lvl9pPr marL="2438339" algn="ctr" rtl="0" eaLnBrk="1" fontAlgn="base" hangingPunct="1">
         <a:spcBef>
           <a:spcPct val="0"/>
         </a:spcBef>
         <a:spcAft>
           <a:spcPct val="0"/>
         </a:spcAft>
-        <a:defRPr sz="2400" b="1">
+        <a:defRPr sz="3200" b="1">
           <a:solidFill>
             <a:srgbClr val="000076"/>
           </a:solidFill>
@@ -3701,7 +3701,7 @@
         <a:buSzPct val="100000"/>
         <a:buFont typeface="Arial" panose="020B0604020202020204" pitchFamily="34" charset="0"/>
         <a:buNone/>
-        <a:defRPr sz="2000">
+        <a:defRPr sz="2667">
           <a:solidFill>
             <a:schemeClr val="tx1"/>
           </a:solidFill>
@@ -3710,7 +3710,7 @@
           <a:cs typeface="ＭＳ Ｐゴシック"/>
         </a:defRPr>
       </a:lvl1pPr>
-      <a:lvl2pPr marL="268288" indent="-268288" algn="l" rtl="0" eaLnBrk="1" fontAlgn="base" hangingPunct="1">
+      <a:lvl2pPr marL="357708" indent="-357708" algn="l" rtl="0" eaLnBrk="1" fontAlgn="base" hangingPunct="1">
         <a:spcBef>
           <a:spcPct val="20000"/>
         </a:spcBef>
@@ -3724,7 +3724,7 @@
         <a:buBlip>
           <a:blip r:embed="rId14"/>
         </a:buBlip>
-        <a:defRPr sz="2400">
+        <a:defRPr sz="3200">
           <a:solidFill>
             <a:schemeClr val="tx1"/>
           </a:solidFill>
@@ -3733,7 +3733,7 @@
           <a:cs typeface="ＭＳ Ｐゴシック"/>
         </a:defRPr>
       </a:lvl2pPr>
-      <a:lvl3pPr marL="536575" indent="-268288" algn="l" rtl="0" eaLnBrk="1" fontAlgn="base" hangingPunct="1">
+      <a:lvl3pPr marL="715415" indent="-357708" algn="l" rtl="0" eaLnBrk="1" fontAlgn="base" hangingPunct="1">
         <a:spcBef>
           <a:spcPct val="20000"/>
         </a:spcBef>
@@ -3754,7 +3754,7 @@
           <a:cs typeface="ＭＳ Ｐゴシック"/>
         </a:defRPr>
       </a:lvl3pPr>
-      <a:lvl4pPr marL="804863" indent="-268288" algn="l" rtl="0" eaLnBrk="1" fontAlgn="base" hangingPunct="1">
+      <a:lvl4pPr marL="1073124" indent="-357708" algn="l" rtl="0" eaLnBrk="1" fontAlgn="base" hangingPunct="1">
         <a:spcBef>
           <a:spcPct val="20000"/>
         </a:spcBef>
@@ -3766,7 +3766,7 @@
         </a:buClr>
         <a:buFont typeface="Times New Roman" panose="02020603050405020304" pitchFamily="18" charset="0"/>
         <a:buChar char="-"/>
-        <a:defRPr sz="1600">
+        <a:defRPr sz="2133">
           <a:solidFill>
             <a:schemeClr val="tx1"/>
           </a:solidFill>
@@ -3775,7 +3775,7 @@
           <a:cs typeface="ＭＳ Ｐゴシック"/>
         </a:defRPr>
       </a:lvl4pPr>
-      <a:lvl5pPr marL="1073150" indent="-268288" algn="l" rtl="0" eaLnBrk="1" fontAlgn="base" hangingPunct="1">
+      <a:lvl5pPr marL="1430831" indent="-357708" algn="l" rtl="0" eaLnBrk="1" fontAlgn="base" hangingPunct="1">
         <a:spcBef>
           <a:spcPct val="20000"/>
         </a:spcBef>
@@ -3787,7 +3787,7 @@
         </a:buClr>
         <a:buFont typeface="Wingdings" pitchFamily="-1" charset="2"/>
         <a:buChar char="§"/>
-        <a:defRPr sz="1400">
+        <a:defRPr sz="1867">
           <a:solidFill>
             <a:schemeClr val="tx1"/>
           </a:solidFill>
@@ -3796,7 +3796,7 @@
           <a:cs typeface="ＭＳ Ｐゴシック"/>
         </a:defRPr>
       </a:lvl5pPr>
-      <a:lvl6pPr marL="2514600" indent="-228600" algn="l" rtl="0" eaLnBrk="1" fontAlgn="base" hangingPunct="1">
+      <a:lvl6pPr marL="3352716" indent="-304792" algn="l" rtl="0" eaLnBrk="1" fontAlgn="base" hangingPunct="1">
         <a:spcBef>
           <a:spcPct val="20000"/>
         </a:spcBef>
@@ -3805,7 +3805,7 @@
         </a:spcAft>
         <a:buFont typeface="Wingdings" pitchFamily="2" charset="2"/>
         <a:buChar char="§"/>
-        <a:defRPr sz="1200">
+        <a:defRPr sz="1600">
           <a:solidFill>
             <a:schemeClr val="tx1"/>
           </a:solidFill>
@@ -3813,7 +3813,7 @@
           <a:ea typeface="+mn-ea"/>
         </a:defRPr>
       </a:lvl6pPr>
-      <a:lvl7pPr marL="2971800" indent="-228600" algn="l" rtl="0" eaLnBrk="1" fontAlgn="base" hangingPunct="1">
+      <a:lvl7pPr marL="3962301" indent="-304792" algn="l" rtl="0" eaLnBrk="1" fontAlgn="base" hangingPunct="1">
         <a:spcBef>
           <a:spcPct val="20000"/>
         </a:spcBef>
@@ -3822,7 +3822,7 @@
         </a:spcAft>
         <a:buFont typeface="Wingdings" pitchFamily="2" charset="2"/>
         <a:buChar char="§"/>
-        <a:defRPr sz="1200">
+        <a:defRPr sz="1600">
           <a:solidFill>
             <a:schemeClr val="tx1"/>
           </a:solidFill>
@@ -3830,7 +3830,7 @@
           <a:ea typeface="+mn-ea"/>
         </a:defRPr>
       </a:lvl7pPr>
-      <a:lvl8pPr marL="3429000" indent="-228600" algn="l" rtl="0" eaLnBrk="1" fontAlgn="base" hangingPunct="1">
+      <a:lvl8pPr marL="4571886" indent="-304792" algn="l" rtl="0" eaLnBrk="1" fontAlgn="base" hangingPunct="1">
         <a:spcBef>
           <a:spcPct val="20000"/>
         </a:spcBef>
@@ -3839,7 +3839,7 @@
         </a:spcAft>
         <a:buFont typeface="Wingdings" pitchFamily="2" charset="2"/>
         <a:buChar char="§"/>
-        <a:defRPr sz="1200">
+        <a:defRPr sz="1600">
           <a:solidFill>
             <a:schemeClr val="tx1"/>
           </a:solidFill>
@@ -3847,7 +3847,7 @@
           <a:ea typeface="+mn-ea"/>
         </a:defRPr>
       </a:lvl8pPr>
-      <a:lvl9pPr marL="3886200" indent="-228600" algn="l" rtl="0" eaLnBrk="1" fontAlgn="base" hangingPunct="1">
+      <a:lvl9pPr marL="5181470" indent="-304792" algn="l" rtl="0" eaLnBrk="1" fontAlgn="base" hangingPunct="1">
         <a:spcBef>
           <a:spcPct val="20000"/>
         </a:spcBef>
@@ -3856,7 +3856,7 @@
         </a:spcAft>
         <a:buFont typeface="Wingdings" pitchFamily="2" charset="2"/>
         <a:buChar char="§"/>
-        <a:defRPr sz="1200">
+        <a:defRPr sz="1600">
           <a:solidFill>
             <a:schemeClr val="tx1"/>
           </a:solidFill>
@@ -3869,8 +3869,8 @@
       <a:defPPr>
         <a:defRPr lang="en-US"/>
       </a:defPPr>
-      <a:lvl1pPr marL="0" algn="l" defTabSz="914400" rtl="0" eaLnBrk="1" latinLnBrk="0" hangingPunct="1">
-        <a:defRPr sz="1800" kern="1200">
+      <a:lvl1pPr marL="0" algn="l" defTabSz="1219170" rtl="0" eaLnBrk="1" latinLnBrk="0" hangingPunct="1">
+        <a:defRPr sz="2400" kern="1200">
           <a:solidFill>
             <a:schemeClr val="tx1"/>
           </a:solidFill>
@@ -3879,8 +3879,8 @@
           <a:cs typeface="+mn-cs"/>
         </a:defRPr>
       </a:lvl1pPr>
-      <a:lvl2pPr marL="457200" algn="l" defTabSz="914400" rtl="0" eaLnBrk="1" latinLnBrk="0" hangingPunct="1">
-        <a:defRPr sz="1800" kern="1200">
+      <a:lvl2pPr marL="609585" algn="l" defTabSz="1219170" rtl="0" eaLnBrk="1" latinLnBrk="0" hangingPunct="1">
+        <a:defRPr sz="2400" kern="1200">
           <a:solidFill>
             <a:schemeClr val="tx1"/>
           </a:solidFill>
@@ -3889,8 +3889,8 @@
           <a:cs typeface="+mn-cs"/>
         </a:defRPr>
       </a:lvl2pPr>
-      <a:lvl3pPr marL="914400" algn="l" defTabSz="914400" rtl="0" eaLnBrk="1" latinLnBrk="0" hangingPunct="1">
-        <a:defRPr sz="1800" kern="1200">
+      <a:lvl3pPr marL="1219170" algn="l" defTabSz="1219170" rtl="0" eaLnBrk="1" latinLnBrk="0" hangingPunct="1">
+        <a:defRPr sz="2400" kern="1200">
           <a:solidFill>
             <a:schemeClr val="tx1"/>
           </a:solidFill>
@@ -3899,8 +3899,8 @@
           <a:cs typeface="+mn-cs"/>
         </a:defRPr>
       </a:lvl3pPr>
-      <a:lvl4pPr marL="1371600" algn="l" defTabSz="914400" rtl="0" eaLnBrk="1" latinLnBrk="0" hangingPunct="1">
-        <a:defRPr sz="1800" kern="1200">
+      <a:lvl4pPr marL="1828754" algn="l" defTabSz="1219170" rtl="0" eaLnBrk="1" latinLnBrk="0" hangingPunct="1">
+        <a:defRPr sz="2400" kern="1200">
           <a:solidFill>
             <a:schemeClr val="tx1"/>
           </a:solidFill>
@@ -3909,8 +3909,8 @@
           <a:cs typeface="+mn-cs"/>
         </a:defRPr>
       </a:lvl4pPr>
-      <a:lvl5pPr marL="1828800" algn="l" defTabSz="914400" rtl="0" eaLnBrk="1" latinLnBrk="0" hangingPunct="1">
-        <a:defRPr sz="1800" kern="1200">
+      <a:lvl5pPr marL="2438339" algn="l" defTabSz="1219170" rtl="0" eaLnBrk="1" latinLnBrk="0" hangingPunct="1">
+        <a:defRPr sz="2400" kern="1200">
           <a:solidFill>
             <a:schemeClr val="tx1"/>
           </a:solidFill>
@@ -3919,8 +3919,8 @@
           <a:cs typeface="+mn-cs"/>
         </a:defRPr>
       </a:lvl5pPr>
-      <a:lvl6pPr marL="2286000" algn="l" defTabSz="914400" rtl="0" eaLnBrk="1" latinLnBrk="0" hangingPunct="1">
-        <a:defRPr sz="1800" kern="1200">
+      <a:lvl6pPr marL="3047924" algn="l" defTabSz="1219170" rtl="0" eaLnBrk="1" latinLnBrk="0" hangingPunct="1">
+        <a:defRPr sz="2400" kern="1200">
           <a:solidFill>
             <a:schemeClr val="tx1"/>
           </a:solidFill>
@@ -3929,8 +3929,8 @@
           <a:cs typeface="+mn-cs"/>
         </a:defRPr>
       </a:lvl6pPr>
-      <a:lvl7pPr marL="2743200" algn="l" defTabSz="914400" rtl="0" eaLnBrk="1" latinLnBrk="0" hangingPunct="1">
-        <a:defRPr sz="1800" kern="1200">
+      <a:lvl7pPr marL="3657509" algn="l" defTabSz="1219170" rtl="0" eaLnBrk="1" latinLnBrk="0" hangingPunct="1">
+        <a:defRPr sz="2400" kern="1200">
           <a:solidFill>
             <a:schemeClr val="tx1"/>
           </a:solidFill>
@@ -3939,8 +3939,8 @@
           <a:cs typeface="+mn-cs"/>
         </a:defRPr>
       </a:lvl7pPr>
-      <a:lvl8pPr marL="3200400" algn="l" defTabSz="914400" rtl="0" eaLnBrk="1" latinLnBrk="0" hangingPunct="1">
-        <a:defRPr sz="1800" kern="1200">
+      <a:lvl8pPr marL="4267093" algn="l" defTabSz="1219170" rtl="0" eaLnBrk="1" latinLnBrk="0" hangingPunct="1">
+        <a:defRPr sz="2400" kern="1200">
           <a:solidFill>
             <a:schemeClr val="tx1"/>
           </a:solidFill>
@@ -3949,8 +3949,8 @@
           <a:cs typeface="+mn-cs"/>
         </a:defRPr>
       </a:lvl8pPr>
-      <a:lvl9pPr marL="3657600" algn="l" defTabSz="914400" rtl="0" eaLnBrk="1" latinLnBrk="0" hangingPunct="1">
-        <a:defRPr sz="1800" kern="1200">
+      <a:lvl9pPr marL="4876678" algn="l" defTabSz="1219170" rtl="0" eaLnBrk="1" latinLnBrk="0" hangingPunct="1">
+        <a:defRPr sz="2400" kern="1200">
           <a:solidFill>
             <a:schemeClr val="tx1"/>
           </a:solidFill>
@@ -3991,8 +3991,8 @@
         </p:nvSpPr>
         <p:spPr bwMode="auto">
           <a:xfrm>
-            <a:off x="304800" y="5562600"/>
-            <a:ext cx="8534400" cy="593725"/>
+            <a:off x="406400" y="7416800"/>
+            <a:ext cx="11379200" cy="666786"/>
           </a:xfrm>
           <a:prstGeom prst="rect">
             <a:avLst/>
@@ -4013,14 +4013,14 @@
           <a:p>
             <a:pPr algn="r" eaLnBrk="0" hangingPunct="0"/>
             <a:r>
-              <a:rPr lang="en-US" sz="2800">
+              <a:rPr lang="en-US" sz="3733">
                 <a:solidFill>
                   <a:srgbClr val="33335E"/>
                 </a:solidFill>
               </a:rPr>
               <a:t> </a:t>
             </a:r>
-            <a:endParaRPr lang="en-US">
+            <a:endParaRPr lang="en-US" sz="4267">
               <a:solidFill>
                 <a:schemeClr val="bg1"/>
               </a:solidFill>
@@ -4038,8 +4038,8 @@
         </p:nvSpPr>
         <p:spPr bwMode="auto">
           <a:xfrm>
-            <a:off x="5981700" y="6486525"/>
-            <a:ext cx="2755900" cy="228600"/>
+            <a:off x="7975600" y="8648700"/>
+            <a:ext cx="3674533" cy="304800"/>
           </a:xfrm>
           <a:prstGeom prst="rect">
             <a:avLst/>
@@ -4058,7 +4058,7 @@
           <a:p>
             <a:pPr algn="r" eaLnBrk="0" hangingPunct="0"/>
             <a:r>
-              <a:rPr lang="en-US" sz="900" b="1">
+              <a:rPr lang="en-US" sz="1200" b="1">
                 <a:solidFill>
                   <a:schemeClr val="bg2"/>
                 </a:solidFill>
@@ -4081,8 +4081,8 @@
         </p:nvSpPr>
         <p:spPr>
           <a:xfrm>
-            <a:off x="2404701" y="609600"/>
-            <a:ext cx="1176699" cy="309780"/>
+            <a:off x="3206269" y="812800"/>
+            <a:ext cx="1568932" cy="413040"/>
           </a:xfrm>
         </p:spPr>
         <p:txBody>

</xml_diff>